<commit_message>
Change title of this presentation
Change title of this presentation
</commit_message>
<xml_diff>
--- a/Course Content/Scrum vs Kanban.pptx
+++ b/Course Content/Scrum vs Kanban.pptx
@@ -114,16 +114,32 @@
 </p:presentation>
 </file>
 
-<file path=ppt/revisionInfo.xml><?xml version="1.0" encoding="utf-8"?>
-<p1510:revInfo xmlns:a="http://schemas.openxmlformats.org/drawingml/2006/main" xmlns:r="http://schemas.openxmlformats.org/officeDocument/2006/relationships" xmlns:p1510="http://schemas.microsoft.com/office/powerpoint/2015/10/main">
-  <p1510:revLst>
-    <p1510:client id="{449A7495-3A14-45AC-8030-46D4AF9CFA7F}" v="2" dt="2022-02-01T13:23:26.143"/>
-  </p1510:revLst>
-</p1510:revInfo>
-</file>
-
 <file path=ppt/changesInfos/changesInfo1.xml><?xml version="1.0" encoding="utf-8"?>
 <pc:chgInfo xmlns:a="http://schemas.openxmlformats.org/drawingml/2006/main" xmlns:r="http://schemas.openxmlformats.org/officeDocument/2006/relationships" xmlns:ac="http://schemas.microsoft.com/office/drawing/2013/main/command" xmlns:pc="http://schemas.microsoft.com/office/powerpoint/2013/main/command">
+  <pc:docChgLst>
+    <pc:chgData name="Martin Schray" userId="bf4f4853c980e97a" providerId="LiveId" clId="{94BFC9A6-973F-4AFA-9409-0391A8909D36}"/>
+    <pc:docChg chg="modSld">
+      <pc:chgData name="Martin Schray" userId="bf4f4853c980e97a" providerId="LiveId" clId="{94BFC9A6-973F-4AFA-9409-0391A8909D36}" dt="2023-10-30T23:39:18.216" v="17" actId="20577"/>
+      <pc:docMkLst>
+        <pc:docMk/>
+      </pc:docMkLst>
+      <pc:sldChg chg="modSp mod">
+        <pc:chgData name="Martin Schray" userId="bf4f4853c980e97a" providerId="LiveId" clId="{94BFC9A6-973F-4AFA-9409-0391A8909D36}" dt="2023-10-30T23:39:18.216" v="17" actId="20577"/>
+        <pc:sldMkLst>
+          <pc:docMk/>
+          <pc:sldMk cId="1999812440" sldId="256"/>
+        </pc:sldMkLst>
+        <pc:spChg chg="mod">
+          <ac:chgData name="Martin Schray" userId="bf4f4853c980e97a" providerId="LiveId" clId="{94BFC9A6-973F-4AFA-9409-0391A8909D36}" dt="2023-10-30T23:39:18.216" v="17" actId="20577"/>
+          <ac:spMkLst>
+            <pc:docMk/>
+            <pc:sldMk cId="1999812440" sldId="256"/>
+            <ac:spMk id="2" creationId="{CCC5E7D6-A9F6-45BE-9D4B-662B6AAD5EB1}"/>
+          </ac:spMkLst>
+        </pc:spChg>
+      </pc:sldChg>
+    </pc:docChg>
+  </pc:docChgLst>
   <pc:docChgLst>
     <pc:chgData name="Martin Schray" userId="bf4f4853c980e97a" providerId="LiveId" clId="{449A7495-3A14-45AC-8030-46D4AF9CFA7F}"/>
     <pc:docChg chg="custSel addSld modSld">
@@ -360,7 +376,7 @@
           <a:p>
             <a:fld id="{F39C25FC-304F-4681-BB84-4B2F6E01A696}" type="datetimeFigureOut">
               <a:rPr lang="en-US" smtClean="0"/>
-              <a:t>3/21/2023</a:t>
+              <a:t>10/30/2023</a:t>
             </a:fld>
             <a:endParaRPr lang="en-US"/>
           </a:p>
@@ -558,7 +574,7 @@
           <a:p>
             <a:fld id="{F39C25FC-304F-4681-BB84-4B2F6E01A696}" type="datetimeFigureOut">
               <a:rPr lang="en-US" smtClean="0"/>
-              <a:t>3/21/2023</a:t>
+              <a:t>10/30/2023</a:t>
             </a:fld>
             <a:endParaRPr lang="en-US"/>
           </a:p>
@@ -766,7 +782,7 @@
           <a:p>
             <a:fld id="{F39C25FC-304F-4681-BB84-4B2F6E01A696}" type="datetimeFigureOut">
               <a:rPr lang="en-US" smtClean="0"/>
-              <a:t>3/21/2023</a:t>
+              <a:t>10/30/2023</a:t>
             </a:fld>
             <a:endParaRPr lang="en-US"/>
           </a:p>
@@ -964,7 +980,7 @@
           <a:p>
             <a:fld id="{F39C25FC-304F-4681-BB84-4B2F6E01A696}" type="datetimeFigureOut">
               <a:rPr lang="en-US" smtClean="0"/>
-              <a:t>3/21/2023</a:t>
+              <a:t>10/30/2023</a:t>
             </a:fld>
             <a:endParaRPr lang="en-US"/>
           </a:p>
@@ -1239,7 +1255,7 @@
           <a:p>
             <a:fld id="{F39C25FC-304F-4681-BB84-4B2F6E01A696}" type="datetimeFigureOut">
               <a:rPr lang="en-US" smtClean="0"/>
-              <a:t>3/21/2023</a:t>
+              <a:t>10/30/2023</a:t>
             </a:fld>
             <a:endParaRPr lang="en-US"/>
           </a:p>
@@ -1504,7 +1520,7 @@
           <a:p>
             <a:fld id="{F39C25FC-304F-4681-BB84-4B2F6E01A696}" type="datetimeFigureOut">
               <a:rPr lang="en-US" smtClean="0"/>
-              <a:t>3/21/2023</a:t>
+              <a:t>10/30/2023</a:t>
             </a:fld>
             <a:endParaRPr lang="en-US"/>
           </a:p>
@@ -1916,7 +1932,7 @@
           <a:p>
             <a:fld id="{F39C25FC-304F-4681-BB84-4B2F6E01A696}" type="datetimeFigureOut">
               <a:rPr lang="en-US" smtClean="0"/>
-              <a:t>3/21/2023</a:t>
+              <a:t>10/30/2023</a:t>
             </a:fld>
             <a:endParaRPr lang="en-US"/>
           </a:p>
@@ -2057,7 +2073,7 @@
           <a:p>
             <a:fld id="{F39C25FC-304F-4681-BB84-4B2F6E01A696}" type="datetimeFigureOut">
               <a:rPr lang="en-US" smtClean="0"/>
-              <a:t>3/21/2023</a:t>
+              <a:t>10/30/2023</a:t>
             </a:fld>
             <a:endParaRPr lang="en-US"/>
           </a:p>
@@ -2170,7 +2186,7 @@
           <a:p>
             <a:fld id="{F39C25FC-304F-4681-BB84-4B2F6E01A696}" type="datetimeFigureOut">
               <a:rPr lang="en-US" smtClean="0"/>
-              <a:t>3/21/2023</a:t>
+              <a:t>10/30/2023</a:t>
             </a:fld>
             <a:endParaRPr lang="en-US"/>
           </a:p>
@@ -2481,7 +2497,7 @@
           <a:p>
             <a:fld id="{F39C25FC-304F-4681-BB84-4B2F6E01A696}" type="datetimeFigureOut">
               <a:rPr lang="en-US" smtClean="0"/>
-              <a:t>3/21/2023</a:t>
+              <a:t>10/30/2023</a:t>
             </a:fld>
             <a:endParaRPr lang="en-US"/>
           </a:p>
@@ -2769,7 +2785,7 @@
           <a:p>
             <a:fld id="{F39C25FC-304F-4681-BB84-4B2F6E01A696}" type="datetimeFigureOut">
               <a:rPr lang="en-US" smtClean="0"/>
-              <a:t>3/21/2023</a:t>
+              <a:t>10/30/2023</a:t>
             </a:fld>
             <a:endParaRPr lang="en-US"/>
           </a:p>
@@ -3010,7 +3026,7 @@
           <a:p>
             <a:fld id="{F39C25FC-304F-4681-BB84-4B2F6E01A696}" type="datetimeFigureOut">
               <a:rPr lang="en-US" smtClean="0"/>
-              <a:t>3/21/2023</a:t>
+              <a:t>10/30/2023</a:t>
             </a:fld>
             <a:endParaRPr lang="en-US"/>
           </a:p>
@@ -3450,7 +3466,7 @@
           <a:p>
             <a:r>
               <a:rPr lang="en-US" dirty="0"/>
-              <a:t>Kanban the Agile Process</a:t>
+              <a:t>Kanban vs. Scrum</a:t>
             </a:r>
           </a:p>
         </p:txBody>

</xml_diff>